<commit_message>
FT64v7 - doc update
</commit_message>
<xml_diff>
--- a/FT64/v7/doc/IDPlacement2.pptx
+++ b/FT64/v7/doc/IDPlacement2.pptx
@@ -20,6 +20,7 @@
     <p:sldId id="268" r:id="rId14"/>
     <p:sldId id="269" r:id="rId15"/>
     <p:sldId id="270" r:id="rId16"/>
+    <p:sldId id="256" r:id="rId17"/>
   </p:sldIdLst>
   <p:sldSz cx="12192000" cy="6858000"/>
   <p:notesSz cx="6858000" cy="9144000"/>
@@ -275,7 +276,7 @@
           <a:p>
             <a:fld id="{8EF71435-511A-4494-890B-AFD18B90220B}" type="datetimeFigureOut">
               <a:rPr lang="en-CA" smtClean="0"/>
-              <a:t>2018-11-19</a:t>
+              <a:t>2018-11-21</a:t>
             </a:fld>
             <a:endParaRPr lang="en-CA"/>
           </a:p>
@@ -475,7 +476,7 @@
           <a:p>
             <a:fld id="{8EF71435-511A-4494-890B-AFD18B90220B}" type="datetimeFigureOut">
               <a:rPr lang="en-CA" smtClean="0"/>
-              <a:t>2018-11-19</a:t>
+              <a:t>2018-11-21</a:t>
             </a:fld>
             <a:endParaRPr lang="en-CA"/>
           </a:p>
@@ -685,7 +686,7 @@
           <a:p>
             <a:fld id="{8EF71435-511A-4494-890B-AFD18B90220B}" type="datetimeFigureOut">
               <a:rPr lang="en-CA" smtClean="0"/>
-              <a:t>2018-11-19</a:t>
+              <a:t>2018-11-21</a:t>
             </a:fld>
             <a:endParaRPr lang="en-CA"/>
           </a:p>
@@ -885,7 +886,7 @@
           <a:p>
             <a:fld id="{8EF71435-511A-4494-890B-AFD18B90220B}" type="datetimeFigureOut">
               <a:rPr lang="en-CA" smtClean="0"/>
-              <a:t>2018-11-19</a:t>
+              <a:t>2018-11-21</a:t>
             </a:fld>
             <a:endParaRPr lang="en-CA"/>
           </a:p>
@@ -1161,7 +1162,7 @@
           <a:p>
             <a:fld id="{8EF71435-511A-4494-890B-AFD18B90220B}" type="datetimeFigureOut">
               <a:rPr lang="en-CA" smtClean="0"/>
-              <a:t>2018-11-19</a:t>
+              <a:t>2018-11-21</a:t>
             </a:fld>
             <a:endParaRPr lang="en-CA"/>
           </a:p>
@@ -1429,7 +1430,7 @@
           <a:p>
             <a:fld id="{8EF71435-511A-4494-890B-AFD18B90220B}" type="datetimeFigureOut">
               <a:rPr lang="en-CA" smtClean="0"/>
-              <a:t>2018-11-19</a:t>
+              <a:t>2018-11-21</a:t>
             </a:fld>
             <a:endParaRPr lang="en-CA"/>
           </a:p>
@@ -1844,7 +1845,7 @@
           <a:p>
             <a:fld id="{8EF71435-511A-4494-890B-AFD18B90220B}" type="datetimeFigureOut">
               <a:rPr lang="en-CA" smtClean="0"/>
-              <a:t>2018-11-19</a:t>
+              <a:t>2018-11-21</a:t>
             </a:fld>
             <a:endParaRPr lang="en-CA"/>
           </a:p>
@@ -1986,7 +1987,7 @@
           <a:p>
             <a:fld id="{8EF71435-511A-4494-890B-AFD18B90220B}" type="datetimeFigureOut">
               <a:rPr lang="en-CA" smtClean="0"/>
-              <a:t>2018-11-19</a:t>
+              <a:t>2018-11-21</a:t>
             </a:fld>
             <a:endParaRPr lang="en-CA"/>
           </a:p>
@@ -2099,7 +2100,7 @@
           <a:p>
             <a:fld id="{8EF71435-511A-4494-890B-AFD18B90220B}" type="datetimeFigureOut">
               <a:rPr lang="en-CA" smtClean="0"/>
-              <a:t>2018-11-19</a:t>
+              <a:t>2018-11-21</a:t>
             </a:fld>
             <a:endParaRPr lang="en-CA"/>
           </a:p>
@@ -2412,7 +2413,7 @@
           <a:p>
             <a:fld id="{8EF71435-511A-4494-890B-AFD18B90220B}" type="datetimeFigureOut">
               <a:rPr lang="en-CA" smtClean="0"/>
-              <a:t>2018-11-19</a:t>
+              <a:t>2018-11-21</a:t>
             </a:fld>
             <a:endParaRPr lang="en-CA"/>
           </a:p>
@@ -2701,7 +2702,7 @@
           <a:p>
             <a:fld id="{8EF71435-511A-4494-890B-AFD18B90220B}" type="datetimeFigureOut">
               <a:rPr lang="en-CA" smtClean="0"/>
-              <a:t>2018-11-19</a:t>
+              <a:t>2018-11-21</a:t>
             </a:fld>
             <a:endParaRPr lang="en-CA"/>
           </a:p>
@@ -2944,7 +2945,7 @@
           <a:p>
             <a:fld id="{8EF71435-511A-4494-890B-AFD18B90220B}" type="datetimeFigureOut">
               <a:rPr lang="en-CA" smtClean="0"/>
-              <a:t>2018-11-19</a:t>
+              <a:t>2018-11-21</a:t>
             </a:fld>
             <a:endParaRPr lang="en-CA"/>
           </a:p>
@@ -11183,6 +11184,758 @@
 </p:sld>
 </file>
 
+<file path=ppt/slides/slide16.xml><?xml version="1.0" encoding="utf-8"?>
+<p:sld xmlns:a="http://schemas.openxmlformats.org/drawingml/2006/main" xmlns:r="http://schemas.openxmlformats.org/officeDocument/2006/relationships" xmlns:p="http://schemas.openxmlformats.org/presentationml/2006/main">
+  <p:cSld>
+    <p:spTree>
+      <p:nvGrpSpPr>
+        <p:cNvPr id="1" name=""/>
+        <p:cNvGrpSpPr/>
+        <p:nvPr/>
+      </p:nvGrpSpPr>
+      <p:grpSpPr>
+        <a:xfrm>
+          <a:off x="0" y="0"/>
+          <a:ext cx="0" cy="0"/>
+          <a:chOff x="0" y="0"/>
+          <a:chExt cx="0" cy="0"/>
+        </a:xfrm>
+      </p:grpSpPr>
+      <p:sp>
+        <p:nvSpPr>
+          <p:cNvPr id="2" name="Title 1">
+            <a:extLst>
+              <a:ext uri="{FF2B5EF4-FFF2-40B4-BE49-F238E27FC236}">
+                <a16:creationId xmlns:a16="http://schemas.microsoft.com/office/drawing/2014/main" id="{58888089-4E2E-4E34-A69C-B63A5C252E37}"/>
+              </a:ext>
+            </a:extLst>
+          </p:cNvPr>
+          <p:cNvSpPr>
+            <a:spLocks noGrp="1"/>
+          </p:cNvSpPr>
+          <p:nvPr>
+            <p:ph type="ctrTitle"/>
+          </p:nvPr>
+        </p:nvSpPr>
+        <p:spPr>
+          <a:xfrm>
+            <a:off x="225552" y="153099"/>
+            <a:ext cx="9144000" cy="1154493"/>
+          </a:xfrm>
+        </p:spPr>
+        <p:txBody>
+          <a:bodyPr/>
+          <a:lstStyle/>
+          <a:p>
+            <a:r>
+              <a:rPr lang="en-CA" dirty="0"/>
+              <a:t>Instruction Conveyor Belt</a:t>
+            </a:r>
+          </a:p>
+        </p:txBody>
+      </p:sp>
+      <p:sp>
+        <p:nvSpPr>
+          <p:cNvPr id="4" name="Rectangle 3">
+            <a:extLst>
+              <a:ext uri="{FF2B5EF4-FFF2-40B4-BE49-F238E27FC236}">
+                <a16:creationId xmlns:a16="http://schemas.microsoft.com/office/drawing/2014/main" id="{F2616649-3C74-42E8-841D-EE72D205D42A}"/>
+              </a:ext>
+            </a:extLst>
+          </p:cNvPr>
+          <p:cNvSpPr/>
+          <p:nvPr/>
+        </p:nvSpPr>
+        <p:spPr>
+          <a:xfrm>
+            <a:off x="2139696" y="1943100"/>
+            <a:ext cx="758952" cy="356616"/>
+          </a:xfrm>
+          <a:prstGeom prst="rect">
+            <a:avLst/>
+          </a:prstGeom>
+        </p:spPr>
+        <p:style>
+          <a:lnRef idx="2">
+            <a:schemeClr val="accent1">
+              <a:shade val="50000"/>
+            </a:schemeClr>
+          </a:lnRef>
+          <a:fillRef idx="1">
+            <a:schemeClr val="accent1"/>
+          </a:fillRef>
+          <a:effectRef idx="0">
+            <a:schemeClr val="accent1"/>
+          </a:effectRef>
+          <a:fontRef idx="minor">
+            <a:schemeClr val="lt1"/>
+          </a:fontRef>
+        </p:style>
+        <p:txBody>
+          <a:bodyPr rtlCol="0" anchor="ctr"/>
+          <a:lstStyle/>
+          <a:p>
+            <a:pPr algn="ctr"/>
+            <a:r>
+              <a:rPr lang="en-CA" sz="1400" dirty="0"/>
+              <a:t>tail2</a:t>
+            </a:r>
+          </a:p>
+        </p:txBody>
+      </p:sp>
+      <p:sp>
+        <p:nvSpPr>
+          <p:cNvPr id="5" name="Rectangle 4">
+            <a:extLst>
+              <a:ext uri="{FF2B5EF4-FFF2-40B4-BE49-F238E27FC236}">
+                <a16:creationId xmlns:a16="http://schemas.microsoft.com/office/drawing/2014/main" id="{F15D2197-6418-40DB-B943-3845E0D88A8B}"/>
+              </a:ext>
+            </a:extLst>
+          </p:cNvPr>
+          <p:cNvSpPr/>
+          <p:nvPr/>
+        </p:nvSpPr>
+        <p:spPr>
+          <a:xfrm>
+            <a:off x="2898648" y="1943100"/>
+            <a:ext cx="758952" cy="356616"/>
+          </a:xfrm>
+          <a:prstGeom prst="rect">
+            <a:avLst/>
+          </a:prstGeom>
+        </p:spPr>
+        <p:style>
+          <a:lnRef idx="2">
+            <a:schemeClr val="accent1">
+              <a:shade val="50000"/>
+            </a:schemeClr>
+          </a:lnRef>
+          <a:fillRef idx="1">
+            <a:schemeClr val="accent1"/>
+          </a:fillRef>
+          <a:effectRef idx="0">
+            <a:schemeClr val="accent1"/>
+          </a:effectRef>
+          <a:fontRef idx="minor">
+            <a:schemeClr val="lt1"/>
+          </a:fontRef>
+        </p:style>
+        <p:txBody>
+          <a:bodyPr rtlCol="0" anchor="ctr"/>
+          <a:lstStyle/>
+          <a:p>
+            <a:pPr algn="ctr"/>
+            <a:r>
+              <a:rPr lang="en-CA" sz="1400" dirty="0"/>
+              <a:t>tail1</a:t>
+            </a:r>
+          </a:p>
+        </p:txBody>
+      </p:sp>
+      <p:sp>
+        <p:nvSpPr>
+          <p:cNvPr id="6" name="Rectangle 5">
+            <a:extLst>
+              <a:ext uri="{FF2B5EF4-FFF2-40B4-BE49-F238E27FC236}">
+                <a16:creationId xmlns:a16="http://schemas.microsoft.com/office/drawing/2014/main" id="{DACF6487-4162-4904-B7CA-831DE4BCE335}"/>
+              </a:ext>
+            </a:extLst>
+          </p:cNvPr>
+          <p:cNvSpPr/>
+          <p:nvPr/>
+        </p:nvSpPr>
+        <p:spPr>
+          <a:xfrm>
+            <a:off x="3657600" y="1943100"/>
+            <a:ext cx="758952" cy="356616"/>
+          </a:xfrm>
+          <a:prstGeom prst="rect">
+            <a:avLst/>
+          </a:prstGeom>
+        </p:spPr>
+        <p:style>
+          <a:lnRef idx="2">
+            <a:schemeClr val="accent1">
+              <a:shade val="50000"/>
+            </a:schemeClr>
+          </a:lnRef>
+          <a:fillRef idx="1">
+            <a:schemeClr val="accent1"/>
+          </a:fillRef>
+          <a:effectRef idx="0">
+            <a:schemeClr val="accent1"/>
+          </a:effectRef>
+          <a:fontRef idx="minor">
+            <a:schemeClr val="lt1"/>
+          </a:fontRef>
+        </p:style>
+        <p:txBody>
+          <a:bodyPr rtlCol="0" anchor="ctr"/>
+          <a:lstStyle/>
+          <a:p>
+            <a:pPr algn="ctr"/>
+            <a:r>
+              <a:rPr lang="en-CA" sz="1400" dirty="0"/>
+              <a:t>tail0</a:t>
+            </a:r>
+          </a:p>
+        </p:txBody>
+      </p:sp>
+      <p:sp>
+        <p:nvSpPr>
+          <p:cNvPr id="7" name="Rectangle 6">
+            <a:extLst>
+              <a:ext uri="{FF2B5EF4-FFF2-40B4-BE49-F238E27FC236}">
+                <a16:creationId xmlns:a16="http://schemas.microsoft.com/office/drawing/2014/main" id="{B207A1D9-E342-486D-BC42-C0797F374758}"/>
+              </a:ext>
+            </a:extLst>
+          </p:cNvPr>
+          <p:cNvSpPr/>
+          <p:nvPr/>
+        </p:nvSpPr>
+        <p:spPr>
+          <a:xfrm>
+            <a:off x="6579357" y="1938528"/>
+            <a:ext cx="758952" cy="356616"/>
+          </a:xfrm>
+          <a:prstGeom prst="rect">
+            <a:avLst/>
+          </a:prstGeom>
+        </p:spPr>
+        <p:style>
+          <a:lnRef idx="2">
+            <a:schemeClr val="accent1">
+              <a:shade val="50000"/>
+            </a:schemeClr>
+          </a:lnRef>
+          <a:fillRef idx="1">
+            <a:schemeClr val="accent1"/>
+          </a:fillRef>
+          <a:effectRef idx="0">
+            <a:schemeClr val="accent1"/>
+          </a:effectRef>
+          <a:fontRef idx="minor">
+            <a:schemeClr val="lt1"/>
+          </a:fontRef>
+        </p:style>
+        <p:txBody>
+          <a:bodyPr rtlCol="0" anchor="ctr"/>
+          <a:lstStyle/>
+          <a:p>
+            <a:pPr algn="ctr"/>
+            <a:r>
+              <a:rPr lang="en-CA" sz="1400" dirty="0"/>
+              <a:t>head2</a:t>
+            </a:r>
+          </a:p>
+        </p:txBody>
+      </p:sp>
+      <p:sp>
+        <p:nvSpPr>
+          <p:cNvPr id="8" name="Rectangle 7">
+            <a:extLst>
+              <a:ext uri="{FF2B5EF4-FFF2-40B4-BE49-F238E27FC236}">
+                <a16:creationId xmlns:a16="http://schemas.microsoft.com/office/drawing/2014/main" id="{4B704DC6-66EA-498F-820A-C12FD3C077CC}"/>
+              </a:ext>
+            </a:extLst>
+          </p:cNvPr>
+          <p:cNvSpPr/>
+          <p:nvPr/>
+        </p:nvSpPr>
+        <p:spPr>
+          <a:xfrm>
+            <a:off x="7338309" y="1938528"/>
+            <a:ext cx="758952" cy="356616"/>
+          </a:xfrm>
+          <a:prstGeom prst="rect">
+            <a:avLst/>
+          </a:prstGeom>
+        </p:spPr>
+        <p:style>
+          <a:lnRef idx="2">
+            <a:schemeClr val="accent1">
+              <a:shade val="50000"/>
+            </a:schemeClr>
+          </a:lnRef>
+          <a:fillRef idx="1">
+            <a:schemeClr val="accent1"/>
+          </a:fillRef>
+          <a:effectRef idx="0">
+            <a:schemeClr val="accent1"/>
+          </a:effectRef>
+          <a:fontRef idx="minor">
+            <a:schemeClr val="lt1"/>
+          </a:fontRef>
+        </p:style>
+        <p:txBody>
+          <a:bodyPr rtlCol="0" anchor="ctr"/>
+          <a:lstStyle/>
+          <a:p>
+            <a:pPr algn="ctr"/>
+            <a:r>
+              <a:rPr lang="en-CA" sz="1400" dirty="0"/>
+              <a:t>head1</a:t>
+            </a:r>
+          </a:p>
+        </p:txBody>
+      </p:sp>
+      <p:sp>
+        <p:nvSpPr>
+          <p:cNvPr id="9" name="Rectangle 8">
+            <a:extLst>
+              <a:ext uri="{FF2B5EF4-FFF2-40B4-BE49-F238E27FC236}">
+                <a16:creationId xmlns:a16="http://schemas.microsoft.com/office/drawing/2014/main" id="{EE38204C-AF26-4836-B7D3-A66B90257417}"/>
+              </a:ext>
+            </a:extLst>
+          </p:cNvPr>
+          <p:cNvSpPr/>
+          <p:nvPr/>
+        </p:nvSpPr>
+        <p:spPr>
+          <a:xfrm>
+            <a:off x="8097261" y="1938528"/>
+            <a:ext cx="758952" cy="356616"/>
+          </a:xfrm>
+          <a:prstGeom prst="rect">
+            <a:avLst/>
+          </a:prstGeom>
+        </p:spPr>
+        <p:style>
+          <a:lnRef idx="2">
+            <a:schemeClr val="accent1">
+              <a:shade val="50000"/>
+            </a:schemeClr>
+          </a:lnRef>
+          <a:fillRef idx="1">
+            <a:schemeClr val="accent1"/>
+          </a:fillRef>
+          <a:effectRef idx="0">
+            <a:schemeClr val="accent1"/>
+          </a:effectRef>
+          <a:fontRef idx="minor">
+            <a:schemeClr val="lt1"/>
+          </a:fontRef>
+        </p:style>
+        <p:txBody>
+          <a:bodyPr rtlCol="0" anchor="ctr"/>
+          <a:lstStyle/>
+          <a:p>
+            <a:pPr algn="ctr"/>
+            <a:r>
+              <a:rPr lang="en-CA" sz="1400" dirty="0"/>
+              <a:t>head0</a:t>
+            </a:r>
+          </a:p>
+        </p:txBody>
+      </p:sp>
+      <p:cxnSp>
+        <p:nvCxnSpPr>
+          <p:cNvPr id="11" name="Straight Arrow Connector 10">
+            <a:extLst>
+              <a:ext uri="{FF2B5EF4-FFF2-40B4-BE49-F238E27FC236}">
+                <a16:creationId xmlns:a16="http://schemas.microsoft.com/office/drawing/2014/main" id="{528C03DD-8B11-4959-AF03-56E5BC3F3090}"/>
+              </a:ext>
+            </a:extLst>
+          </p:cNvPr>
+          <p:cNvCxnSpPr>
+            <a:cxnSpLocks/>
+            <a:stCxn id="6" idx="3"/>
+            <a:endCxn id="21" idx="1"/>
+          </p:cNvCxnSpPr>
+          <p:nvPr/>
+        </p:nvCxnSpPr>
+        <p:spPr>
+          <a:xfrm>
+            <a:off x="4416552" y="2121408"/>
+            <a:ext cx="299638" cy="0"/>
+          </a:xfrm>
+          <a:prstGeom prst="straightConnector1">
+            <a:avLst/>
+          </a:prstGeom>
+          <a:ln>
+            <a:tailEnd type="triangle"/>
+          </a:ln>
+        </p:spPr>
+        <p:style>
+          <a:lnRef idx="1">
+            <a:schemeClr val="accent1"/>
+          </a:lnRef>
+          <a:fillRef idx="0">
+            <a:schemeClr val="accent1"/>
+          </a:fillRef>
+          <a:effectRef idx="0">
+            <a:schemeClr val="accent1"/>
+          </a:effectRef>
+          <a:fontRef idx="minor">
+            <a:schemeClr val="tx1"/>
+          </a:fontRef>
+        </p:style>
+      </p:cxnSp>
+      <p:sp>
+        <p:nvSpPr>
+          <p:cNvPr id="12" name="TextBox 11">
+            <a:extLst>
+              <a:ext uri="{FF2B5EF4-FFF2-40B4-BE49-F238E27FC236}">
+                <a16:creationId xmlns:a16="http://schemas.microsoft.com/office/drawing/2014/main" id="{12F9C69A-3467-4AA3-9DA4-F32DA75652C6}"/>
+              </a:ext>
+            </a:extLst>
+          </p:cNvPr>
+          <p:cNvSpPr txBox="1"/>
+          <p:nvPr/>
+        </p:nvSpPr>
+        <p:spPr>
+          <a:xfrm>
+            <a:off x="868680" y="2935224"/>
+            <a:ext cx="10250424" cy="1477328"/>
+          </a:xfrm>
+          <a:prstGeom prst="rect">
+            <a:avLst/>
+          </a:prstGeom>
+          <a:noFill/>
+        </p:spPr>
+        <p:txBody>
+          <a:bodyPr wrap="square" rtlCol="0">
+            <a:spAutoFit/>
+          </a:bodyPr>
+          <a:lstStyle/>
+          <a:p>
+            <a:r>
+              <a:rPr lang="en-CA" dirty="0"/>
+              <a:t>Basic idea is to use </a:t>
+            </a:r>
+            <a:r>
+              <a:rPr lang="en-CA" dirty="0" err="1"/>
+              <a:t>fifo’s</a:t>
+            </a:r>
+            <a:r>
+              <a:rPr lang="en-CA" dirty="0"/>
+              <a:t> rather than a circular buffer. This is basically a classic split dispatch / </a:t>
+            </a:r>
+            <a:r>
+              <a:rPr lang="en-CA"/>
+              <a:t>re-order buffer.</a:t>
+            </a:r>
+            <a:endParaRPr lang="en-CA" dirty="0"/>
+          </a:p>
+          <a:p>
+            <a:r>
+              <a:rPr lang="en-CA" dirty="0"/>
+              <a:t>Instructions are queued at tail0, tail1, and tail2 as space allows and shifted towards head0, head1, and head2 as instructions commit to the machine state.</a:t>
+            </a:r>
+          </a:p>
+          <a:p>
+            <a:r>
+              <a:rPr lang="en-CA" dirty="0"/>
+              <a:t>Some management of source / destination tags is required. The tags for a given instruction increment as it passes through to commit.</a:t>
+            </a:r>
+          </a:p>
+        </p:txBody>
+      </p:sp>
+      <p:cxnSp>
+        <p:nvCxnSpPr>
+          <p:cNvPr id="14" name="Straight Arrow Connector 13">
+            <a:extLst>
+              <a:ext uri="{FF2B5EF4-FFF2-40B4-BE49-F238E27FC236}">
+                <a16:creationId xmlns:a16="http://schemas.microsoft.com/office/drawing/2014/main" id="{F71A7B2E-F5B0-4F9B-85F2-692A681684BF}"/>
+              </a:ext>
+            </a:extLst>
+          </p:cNvPr>
+          <p:cNvCxnSpPr>
+            <a:stCxn id="9" idx="3"/>
+          </p:cNvCxnSpPr>
+          <p:nvPr/>
+        </p:nvCxnSpPr>
+        <p:spPr>
+          <a:xfrm>
+            <a:off x="8856213" y="2116836"/>
+            <a:ext cx="213360" cy="0"/>
+          </a:xfrm>
+          <a:prstGeom prst="straightConnector1">
+            <a:avLst/>
+          </a:prstGeom>
+          <a:ln>
+            <a:tailEnd type="triangle"/>
+          </a:ln>
+        </p:spPr>
+        <p:style>
+          <a:lnRef idx="1">
+            <a:schemeClr val="accent1"/>
+          </a:lnRef>
+          <a:fillRef idx="0">
+            <a:schemeClr val="accent1"/>
+          </a:fillRef>
+          <a:effectRef idx="0">
+            <a:schemeClr val="accent1"/>
+          </a:effectRef>
+          <a:fontRef idx="minor">
+            <a:schemeClr val="tx1"/>
+          </a:fontRef>
+        </p:style>
+      </p:cxnSp>
+      <p:cxnSp>
+        <p:nvCxnSpPr>
+          <p:cNvPr id="16" name="Straight Arrow Connector 15">
+            <a:extLst>
+              <a:ext uri="{FF2B5EF4-FFF2-40B4-BE49-F238E27FC236}">
+                <a16:creationId xmlns:a16="http://schemas.microsoft.com/office/drawing/2014/main" id="{CF86A73F-E53A-4C34-A142-46209B1599A5}"/>
+              </a:ext>
+            </a:extLst>
+          </p:cNvPr>
+          <p:cNvCxnSpPr>
+            <a:endCxn id="4" idx="1"/>
+          </p:cNvCxnSpPr>
+          <p:nvPr/>
+        </p:nvCxnSpPr>
+        <p:spPr>
+          <a:xfrm>
+            <a:off x="1783080" y="2121408"/>
+            <a:ext cx="356616" cy="0"/>
+          </a:xfrm>
+          <a:prstGeom prst="straightConnector1">
+            <a:avLst/>
+          </a:prstGeom>
+          <a:ln>
+            <a:tailEnd type="triangle"/>
+          </a:ln>
+        </p:spPr>
+        <p:style>
+          <a:lnRef idx="1">
+            <a:schemeClr val="accent1"/>
+          </a:lnRef>
+          <a:fillRef idx="0">
+            <a:schemeClr val="accent1"/>
+          </a:fillRef>
+          <a:effectRef idx="0">
+            <a:schemeClr val="accent1"/>
+          </a:effectRef>
+          <a:fontRef idx="minor">
+            <a:schemeClr val="tx1"/>
+          </a:fontRef>
+        </p:style>
+      </p:cxnSp>
+      <p:sp>
+        <p:nvSpPr>
+          <p:cNvPr id="17" name="TextBox 16">
+            <a:extLst>
+              <a:ext uri="{FF2B5EF4-FFF2-40B4-BE49-F238E27FC236}">
+                <a16:creationId xmlns:a16="http://schemas.microsoft.com/office/drawing/2014/main" id="{F2A84CDE-E45B-4B2E-AB82-9635674B128F}"/>
+              </a:ext>
+            </a:extLst>
+          </p:cNvPr>
+          <p:cNvSpPr txBox="1"/>
+          <p:nvPr/>
+        </p:nvSpPr>
+        <p:spPr>
+          <a:xfrm>
+            <a:off x="1222221" y="1860804"/>
+            <a:ext cx="694998" cy="369332"/>
+          </a:xfrm>
+          <a:prstGeom prst="rect">
+            <a:avLst/>
+          </a:prstGeom>
+          <a:noFill/>
+        </p:spPr>
+        <p:txBody>
+          <a:bodyPr wrap="none" rtlCol="0">
+            <a:spAutoFit/>
+          </a:bodyPr>
+          <a:lstStyle/>
+          <a:p>
+            <a:r>
+              <a:rPr lang="en-CA" dirty="0"/>
+              <a:t>Fetch</a:t>
+            </a:r>
+          </a:p>
+        </p:txBody>
+      </p:sp>
+      <p:sp>
+        <p:nvSpPr>
+          <p:cNvPr id="18" name="TextBox 17">
+            <a:extLst>
+              <a:ext uri="{FF2B5EF4-FFF2-40B4-BE49-F238E27FC236}">
+                <a16:creationId xmlns:a16="http://schemas.microsoft.com/office/drawing/2014/main" id="{E330AD89-BAC6-417E-8AC8-67CD15BC82CF}"/>
+              </a:ext>
+            </a:extLst>
+          </p:cNvPr>
+          <p:cNvSpPr txBox="1"/>
+          <p:nvPr/>
+        </p:nvSpPr>
+        <p:spPr>
+          <a:xfrm>
+            <a:off x="8951295" y="1828014"/>
+            <a:ext cx="928459" cy="369332"/>
+          </a:xfrm>
+          <a:prstGeom prst="rect">
+            <a:avLst/>
+          </a:prstGeom>
+          <a:noFill/>
+        </p:spPr>
+        <p:txBody>
+          <a:bodyPr wrap="none" rtlCol="0">
+            <a:spAutoFit/>
+          </a:bodyPr>
+          <a:lstStyle/>
+          <a:p>
+            <a:r>
+              <a:rPr lang="en-CA" dirty="0"/>
+              <a:t>Commit</a:t>
+            </a:r>
+          </a:p>
+        </p:txBody>
+      </p:sp>
+      <p:sp>
+        <p:nvSpPr>
+          <p:cNvPr id="21" name="Rectangle 20">
+            <a:extLst>
+              <a:ext uri="{FF2B5EF4-FFF2-40B4-BE49-F238E27FC236}">
+                <a16:creationId xmlns:a16="http://schemas.microsoft.com/office/drawing/2014/main" id="{4C888B8E-9449-49CD-92E6-F22324A711A6}"/>
+              </a:ext>
+            </a:extLst>
+          </p:cNvPr>
+          <p:cNvSpPr/>
+          <p:nvPr/>
+        </p:nvSpPr>
+        <p:spPr>
+          <a:xfrm>
+            <a:off x="4716190" y="1943100"/>
+            <a:ext cx="758952" cy="356616"/>
+          </a:xfrm>
+          <a:prstGeom prst="rect">
+            <a:avLst/>
+          </a:prstGeom>
+        </p:spPr>
+        <p:style>
+          <a:lnRef idx="2">
+            <a:schemeClr val="accent1">
+              <a:shade val="50000"/>
+            </a:schemeClr>
+          </a:lnRef>
+          <a:fillRef idx="1">
+            <a:schemeClr val="accent1"/>
+          </a:fillRef>
+          <a:effectRef idx="0">
+            <a:schemeClr val="accent1"/>
+          </a:effectRef>
+          <a:fontRef idx="minor">
+            <a:schemeClr val="lt1"/>
+          </a:fontRef>
+        </p:style>
+        <p:txBody>
+          <a:bodyPr rtlCol="0" anchor="ctr"/>
+          <a:lstStyle/>
+          <a:p>
+            <a:pPr algn="ctr"/>
+            <a:r>
+              <a:rPr lang="en-CA" sz="1400" dirty="0"/>
+              <a:t>Execute</a:t>
+            </a:r>
+          </a:p>
+        </p:txBody>
+      </p:sp>
+      <p:cxnSp>
+        <p:nvCxnSpPr>
+          <p:cNvPr id="24" name="Straight Arrow Connector 23">
+            <a:extLst>
+              <a:ext uri="{FF2B5EF4-FFF2-40B4-BE49-F238E27FC236}">
+                <a16:creationId xmlns:a16="http://schemas.microsoft.com/office/drawing/2014/main" id="{9B21CF2E-2BC5-478D-8119-9BE5488152BB}"/>
+              </a:ext>
+            </a:extLst>
+          </p:cNvPr>
+          <p:cNvCxnSpPr>
+            <a:cxnSpLocks/>
+            <a:endCxn id="7" idx="1"/>
+          </p:cNvCxnSpPr>
+          <p:nvPr/>
+        </p:nvCxnSpPr>
+        <p:spPr>
+          <a:xfrm>
+            <a:off x="6256907" y="2116836"/>
+            <a:ext cx="322450" cy="0"/>
+          </a:xfrm>
+          <a:prstGeom prst="straightConnector1">
+            <a:avLst/>
+          </a:prstGeom>
+          <a:ln>
+            <a:tailEnd type="triangle"/>
+          </a:ln>
+        </p:spPr>
+        <p:style>
+          <a:lnRef idx="1">
+            <a:schemeClr val="accent1"/>
+          </a:lnRef>
+          <a:fillRef idx="0">
+            <a:schemeClr val="accent1"/>
+          </a:fillRef>
+          <a:effectRef idx="0">
+            <a:schemeClr val="accent1"/>
+          </a:effectRef>
+          <a:fontRef idx="minor">
+            <a:schemeClr val="tx1"/>
+          </a:fontRef>
+        </p:style>
+      </p:cxnSp>
+      <p:sp>
+        <p:nvSpPr>
+          <p:cNvPr id="19" name="Rectangle 18">
+            <a:extLst>
+              <a:ext uri="{FF2B5EF4-FFF2-40B4-BE49-F238E27FC236}">
+                <a16:creationId xmlns:a16="http://schemas.microsoft.com/office/drawing/2014/main" id="{A6D476A4-F27C-4304-A17E-965D942A6C83}"/>
+              </a:ext>
+            </a:extLst>
+          </p:cNvPr>
+          <p:cNvSpPr/>
+          <p:nvPr/>
+        </p:nvSpPr>
+        <p:spPr>
+          <a:xfrm>
+            <a:off x="5479124" y="1947672"/>
+            <a:ext cx="758952" cy="356616"/>
+          </a:xfrm>
+          <a:prstGeom prst="rect">
+            <a:avLst/>
+          </a:prstGeom>
+        </p:spPr>
+        <p:style>
+          <a:lnRef idx="2">
+            <a:schemeClr val="accent1">
+              <a:shade val="50000"/>
+            </a:schemeClr>
+          </a:lnRef>
+          <a:fillRef idx="1">
+            <a:schemeClr val="accent1"/>
+          </a:fillRef>
+          <a:effectRef idx="0">
+            <a:schemeClr val="accent1"/>
+          </a:effectRef>
+          <a:fontRef idx="minor">
+            <a:schemeClr val="lt1"/>
+          </a:fontRef>
+        </p:style>
+        <p:txBody>
+          <a:bodyPr rtlCol="0" anchor="ctr"/>
+          <a:lstStyle/>
+          <a:p>
+            <a:pPr algn="ctr"/>
+            <a:r>
+              <a:rPr lang="en-CA" sz="1400" dirty="0"/>
+              <a:t>Execute</a:t>
+            </a:r>
+          </a:p>
+        </p:txBody>
+      </p:sp>
+    </p:spTree>
+    <p:extLst>
+      <p:ext uri="{BB962C8B-B14F-4D97-AF65-F5344CB8AC3E}">
+        <p14:creationId xmlns:p14="http://schemas.microsoft.com/office/powerpoint/2010/main" val="1185342310"/>
+      </p:ext>
+    </p:extLst>
+  </p:cSld>
+  <p:clrMapOvr>
+    <a:masterClrMapping/>
+  </p:clrMapOvr>
+</p:sld>
+</file>
+
 <file path=ppt/slides/slide2.xml><?xml version="1.0" encoding="utf-8"?>
 <p:sld xmlns:a="http://schemas.openxmlformats.org/drawingml/2006/main" xmlns:r="http://schemas.openxmlformats.org/officeDocument/2006/relationships" xmlns:p="http://schemas.openxmlformats.org/presentationml/2006/main">
   <p:cSld>

</xml_diff>